<commit_message>
Update presentation Change conclusion
</commit_message>
<xml_diff>
--- a/Infiniteam - Moj AutoServis - prezentacija - FINAL.pptx
+++ b/Infiniteam - Moj AutoServis - prezentacija - FINAL.pptx
@@ -14,8 +14,9 @@
     <p:sldId id="262" r:id="rId8"/>
     <p:sldId id="264" r:id="rId9"/>
     <p:sldId id="266" r:id="rId10"/>
-    <p:sldId id="267" r:id="rId11"/>
-    <p:sldId id="265" r:id="rId12"/>
+    <p:sldId id="268" r:id="rId11"/>
+    <p:sldId id="267" r:id="rId12"/>
+    <p:sldId id="265" r:id="rId13"/>
   </p:sldIdLst>
   <p:sldSz cx="9144000" cy="6858000" type="screen4x3"/>
   <p:notesSz cx="6858000" cy="9144000"/>
@@ -348,7 +349,7 @@
           <a:p>
             <a:fld id="{995196CA-FC24-4334-9A37-1EB3C56D9F36}" type="datetimeFigureOut">
               <a:rPr lang="en-US" smtClean="0"/>
-              <a:t>20.1.2020.</a:t>
+              <a:t>1/20/2020</a:t>
             </a:fld>
             <a:endParaRPr lang="en-US"/>
           </a:p>
@@ -556,7 +557,7 @@
           <a:p>
             <a:fld id="{995196CA-FC24-4334-9A37-1EB3C56D9F36}" type="datetimeFigureOut">
               <a:rPr lang="en-US" smtClean="0"/>
-              <a:t>20.1.2020.</a:t>
+              <a:t>1/20/2020</a:t>
             </a:fld>
             <a:endParaRPr lang="en-US"/>
           </a:p>
@@ -812,7 +813,7 @@
           <a:p>
             <a:fld id="{995196CA-FC24-4334-9A37-1EB3C56D9F36}" type="datetimeFigureOut">
               <a:rPr lang="en-US" smtClean="0"/>
-              <a:t>20.1.2020.</a:t>
+              <a:t>1/20/2020</a:t>
             </a:fld>
             <a:endParaRPr lang="en-US"/>
           </a:p>
@@ -982,7 +983,7 @@
           <a:p>
             <a:fld id="{995196CA-FC24-4334-9A37-1EB3C56D9F36}" type="datetimeFigureOut">
               <a:rPr lang="en-US" smtClean="0"/>
-              <a:t>20.1.2020.</a:t>
+              <a:t>1/20/2020</a:t>
             </a:fld>
             <a:endParaRPr lang="en-US"/>
           </a:p>
@@ -1325,7 +1326,7 @@
           <a:p>
             <a:fld id="{995196CA-FC24-4334-9A37-1EB3C56D9F36}" type="datetimeFigureOut">
               <a:rPr lang="en-US" smtClean="0"/>
-              <a:t>20.1.2020.</a:t>
+              <a:t>1/20/2020</a:t>
             </a:fld>
             <a:endParaRPr lang="en-US"/>
           </a:p>
@@ -1600,7 +1601,7 @@
           <a:p>
             <a:fld id="{995196CA-FC24-4334-9A37-1EB3C56D9F36}" type="datetimeFigureOut">
               <a:rPr lang="en-US" smtClean="0"/>
-              <a:t>20.1.2020.</a:t>
+              <a:t>1/20/2020</a:t>
             </a:fld>
             <a:endParaRPr lang="en-US"/>
           </a:p>
@@ -1979,7 +1980,7 @@
           <a:p>
             <a:fld id="{995196CA-FC24-4334-9A37-1EB3C56D9F36}" type="datetimeFigureOut">
               <a:rPr lang="en-US" smtClean="0"/>
-              <a:t>20.1.2020.</a:t>
+              <a:t>1/20/2020</a:t>
             </a:fld>
             <a:endParaRPr lang="en-US"/>
           </a:p>
@@ -2097,7 +2098,7 @@
           <a:p>
             <a:fld id="{995196CA-FC24-4334-9A37-1EB3C56D9F36}" type="datetimeFigureOut">
               <a:rPr lang="en-US" smtClean="0"/>
-              <a:t>20.1.2020.</a:t>
+              <a:t>1/20/2020</a:t>
             </a:fld>
             <a:endParaRPr lang="en-US"/>
           </a:p>
@@ -2268,7 +2269,7 @@
           <a:p>
             <a:fld id="{995196CA-FC24-4334-9A37-1EB3C56D9F36}" type="datetimeFigureOut">
               <a:rPr lang="en-US" smtClean="0"/>
-              <a:t>20.1.2020.</a:t>
+              <a:t>1/20/2020</a:t>
             </a:fld>
             <a:endParaRPr lang="en-US"/>
           </a:p>
@@ -2622,7 +2623,7 @@
           <a:p>
             <a:fld id="{995196CA-FC24-4334-9A37-1EB3C56D9F36}" type="datetimeFigureOut">
               <a:rPr lang="en-US" smtClean="0"/>
-              <a:t>20.1.2020.</a:t>
+              <a:t>1/20/2020</a:t>
             </a:fld>
             <a:endParaRPr lang="en-US"/>
           </a:p>
@@ -3004,7 +3005,7 @@
           <a:p>
             <a:fld id="{995196CA-FC24-4334-9A37-1EB3C56D9F36}" type="datetimeFigureOut">
               <a:rPr lang="en-US" smtClean="0"/>
-              <a:t>20.1.2020.</a:t>
+              <a:t>1/20/2020</a:t>
             </a:fld>
             <a:endParaRPr lang="en-US"/>
           </a:p>
@@ -3291,7 +3292,7 @@
           <a:p>
             <a:fld id="{995196CA-FC24-4334-9A37-1EB3C56D9F36}" type="datetimeFigureOut">
               <a:rPr lang="en-US" smtClean="0"/>
-              <a:t>20.1.2020.</a:t>
+              <a:t>1/20/2020</a:t>
             </a:fld>
             <a:endParaRPr lang="en-US"/>
           </a:p>
@@ -4079,6 +4080,371 @@
           <p:cNvPr id="2" name="Title 1">
             <a:extLst>
               <a:ext uri="{FF2B5EF4-FFF2-40B4-BE49-F238E27FC236}">
+                <a16:creationId xmlns:a16="http://schemas.microsoft.com/office/drawing/2014/main" id="{BEC14B54-817C-4EFC-AB79-56B2773FD733}"/>
+              </a:ext>
+            </a:extLst>
+          </p:cNvPr>
+          <p:cNvSpPr>
+            <a:spLocks noGrp="1"/>
+          </p:cNvSpPr>
+          <p:nvPr>
+            <p:ph type="title"/>
+          </p:nvPr>
+        </p:nvSpPr>
+        <p:spPr/>
+        <p:txBody>
+          <a:bodyPr/>
+          <a:lstStyle/>
+          <a:p>
+            <a:r>
+              <a:rPr lang="hr-HR" dirty="0">
+                <a:latin typeface="helvetica" panose="020B0604020202020204" pitchFamily="34" charset="0"/>
+                <a:cs typeface="helvetica" panose="020B0604020202020204" pitchFamily="34" charset="0"/>
+              </a:rPr>
+              <a:t>Organizacija rada</a:t>
+            </a:r>
+            <a:endParaRPr lang="hr-HR" dirty="0"/>
+          </a:p>
+        </p:txBody>
+      </p:sp>
+      <p:sp>
+        <p:nvSpPr>
+          <p:cNvPr id="3" name="Content Placeholder 2">
+            <a:extLst>
+              <a:ext uri="{FF2B5EF4-FFF2-40B4-BE49-F238E27FC236}">
+                <a16:creationId xmlns:a16="http://schemas.microsoft.com/office/drawing/2014/main" id="{C97BEF04-4DA0-4A73-8CF4-07EB009F93ED}"/>
+              </a:ext>
+            </a:extLst>
+          </p:cNvPr>
+          <p:cNvSpPr>
+            <a:spLocks noGrp="1"/>
+          </p:cNvSpPr>
+          <p:nvPr>
+            <p:ph idx="1"/>
+          </p:nvPr>
+        </p:nvSpPr>
+        <p:spPr/>
+        <p:txBody>
+          <a:bodyPr/>
+          <a:lstStyle/>
+          <a:p>
+            <a:pPr marL="251460" indent="-182880">
+              <a:spcBef>
+                <a:spcPts val="200"/>
+              </a:spcBef>
+              <a:spcAft>
+                <a:spcPts val="400"/>
+              </a:spcAft>
+              <a:buFont typeface="Wingdings" panose="05000000000000000000" pitchFamily="2" charset="2"/>
+              <a:buChar char="§"/>
+            </a:pPr>
+            <a:r>
+              <a:rPr lang="en-US" dirty="0" err="1">
+                <a:latin typeface="helvetica" panose="020B0604020202020204" pitchFamily="34" charset="0"/>
+                <a:cs typeface="helvetica" panose="020B0604020202020204" pitchFamily="34" charset="0"/>
+              </a:rPr>
+              <a:t>Raspodjela</a:t>
+            </a:r>
+            <a:r>
+              <a:rPr lang="en-US" dirty="0">
+                <a:latin typeface="helvetica" panose="020B0604020202020204" pitchFamily="34" charset="0"/>
+                <a:cs typeface="helvetica" panose="020B0604020202020204" pitchFamily="34" charset="0"/>
+              </a:rPr>
+              <a:t> </a:t>
+            </a:r>
+            <a:r>
+              <a:rPr lang="en-US" dirty="0" err="1">
+                <a:latin typeface="helvetica" panose="020B0604020202020204" pitchFamily="34" charset="0"/>
+                <a:cs typeface="helvetica" panose="020B0604020202020204" pitchFamily="34" charset="0"/>
+              </a:rPr>
+              <a:t>posla</a:t>
+            </a:r>
+            <a:r>
+              <a:rPr lang="en-US" dirty="0">
+                <a:latin typeface="helvetica" panose="020B0604020202020204" pitchFamily="34" charset="0"/>
+                <a:cs typeface="helvetica" panose="020B0604020202020204" pitchFamily="34" charset="0"/>
+              </a:rPr>
+              <a:t>:</a:t>
+            </a:r>
+          </a:p>
+          <a:p>
+            <a:pPr lvl="1">
+              <a:buFont typeface="Wingdings" panose="05000000000000000000" pitchFamily="2" charset="2"/>
+              <a:buChar char="§"/>
+            </a:pPr>
+            <a:r>
+              <a:rPr lang="en-US" sz="2000" dirty="0" err="1">
+                <a:latin typeface="helvetica" panose="020B0604020202020204" pitchFamily="34" charset="0"/>
+                <a:cs typeface="helvetica" panose="020B0604020202020204" pitchFamily="34" charset="0"/>
+              </a:rPr>
+              <a:t>Svi</a:t>
+            </a:r>
+            <a:r>
+              <a:rPr lang="en-US" sz="2000" dirty="0">
+                <a:latin typeface="helvetica" panose="020B0604020202020204" pitchFamily="34" charset="0"/>
+                <a:cs typeface="helvetica" panose="020B0604020202020204" pitchFamily="34" charset="0"/>
+              </a:rPr>
+              <a:t> </a:t>
+            </a:r>
+            <a:r>
+              <a:rPr lang="en-US" sz="2000" dirty="0" err="1">
+                <a:latin typeface="helvetica" panose="020B0604020202020204" pitchFamily="34" charset="0"/>
+                <a:cs typeface="helvetica" panose="020B0604020202020204" pitchFamily="34" charset="0"/>
+              </a:rPr>
+              <a:t>članovi</a:t>
+            </a:r>
+            <a:r>
+              <a:rPr lang="en-US" sz="2000" dirty="0">
+                <a:latin typeface="helvetica" panose="020B0604020202020204" pitchFamily="34" charset="0"/>
+                <a:cs typeface="helvetica" panose="020B0604020202020204" pitchFamily="34" charset="0"/>
+              </a:rPr>
+              <a:t> </a:t>
+            </a:r>
+            <a:r>
+              <a:rPr lang="en-US" sz="2000" dirty="0" err="1">
+                <a:latin typeface="helvetica" panose="020B0604020202020204" pitchFamily="34" charset="0"/>
+                <a:cs typeface="helvetica" panose="020B0604020202020204" pitchFamily="34" charset="0"/>
+              </a:rPr>
+              <a:t>tima</a:t>
+            </a:r>
+            <a:r>
+              <a:rPr lang="en-US" sz="2000" dirty="0">
+                <a:latin typeface="helvetica" panose="020B0604020202020204" pitchFamily="34" charset="0"/>
+                <a:cs typeface="helvetica" panose="020B0604020202020204" pitchFamily="34" charset="0"/>
+              </a:rPr>
+              <a:t> </a:t>
+            </a:r>
+            <a:r>
+              <a:rPr lang="en-US" sz="2000" dirty="0" err="1">
+                <a:latin typeface="helvetica" panose="020B0604020202020204" pitchFamily="34" charset="0"/>
+                <a:cs typeface="helvetica" panose="020B0604020202020204" pitchFamily="34" charset="0"/>
+              </a:rPr>
+              <a:t>sudjelovali</a:t>
+            </a:r>
+            <a:r>
+              <a:rPr lang="en-US" sz="2000" dirty="0">
+                <a:latin typeface="helvetica" panose="020B0604020202020204" pitchFamily="34" charset="0"/>
+                <a:cs typeface="helvetica" panose="020B0604020202020204" pitchFamily="34" charset="0"/>
+              </a:rPr>
+              <a:t> </a:t>
+            </a:r>
+            <a:r>
+              <a:rPr lang="en-US" sz="2000" dirty="0" err="1">
+                <a:latin typeface="helvetica" panose="020B0604020202020204" pitchFamily="34" charset="0"/>
+                <a:cs typeface="helvetica" panose="020B0604020202020204" pitchFamily="34" charset="0"/>
+              </a:rPr>
+              <a:t>su</a:t>
+            </a:r>
+            <a:r>
+              <a:rPr lang="en-US" sz="2000" dirty="0">
+                <a:latin typeface="helvetica" panose="020B0604020202020204" pitchFamily="34" charset="0"/>
+                <a:cs typeface="helvetica" panose="020B0604020202020204" pitchFamily="34" charset="0"/>
+              </a:rPr>
+              <a:t> u </a:t>
+            </a:r>
+            <a:r>
+              <a:rPr lang="en-US" sz="2000" dirty="0" err="1">
+                <a:latin typeface="helvetica" panose="020B0604020202020204" pitchFamily="34" charset="0"/>
+                <a:cs typeface="helvetica" panose="020B0604020202020204" pitchFamily="34" charset="0"/>
+              </a:rPr>
+              <a:t>pisanju</a:t>
+            </a:r>
+            <a:r>
+              <a:rPr lang="en-US" sz="2000" dirty="0">
+                <a:latin typeface="helvetica" panose="020B0604020202020204" pitchFamily="34" charset="0"/>
+                <a:cs typeface="helvetica" panose="020B0604020202020204" pitchFamily="34" charset="0"/>
+              </a:rPr>
+              <a:t> </a:t>
+            </a:r>
+            <a:r>
+              <a:rPr lang="en-US" sz="2000" dirty="0" err="1">
+                <a:latin typeface="helvetica" panose="020B0604020202020204" pitchFamily="34" charset="0"/>
+                <a:cs typeface="helvetica" panose="020B0604020202020204" pitchFamily="34" charset="0"/>
+              </a:rPr>
+              <a:t>dokumentacije</a:t>
+            </a:r>
+            <a:r>
+              <a:rPr lang="en-US" sz="2000" dirty="0">
+                <a:latin typeface="helvetica" panose="020B0604020202020204" pitchFamily="34" charset="0"/>
+                <a:cs typeface="helvetica" panose="020B0604020202020204" pitchFamily="34" charset="0"/>
+              </a:rPr>
+              <a:t>, </a:t>
+            </a:r>
+            <a:r>
+              <a:rPr lang="en-US" sz="2000" dirty="0" err="1">
+                <a:latin typeface="helvetica" panose="020B0604020202020204" pitchFamily="34" charset="0"/>
+                <a:cs typeface="helvetica" panose="020B0604020202020204" pitchFamily="34" charset="0"/>
+              </a:rPr>
+              <a:t>implementaciji</a:t>
+            </a:r>
+            <a:r>
+              <a:rPr lang="en-US" sz="2000" dirty="0">
+                <a:latin typeface="helvetica" panose="020B0604020202020204" pitchFamily="34" charset="0"/>
+                <a:cs typeface="helvetica" panose="020B0604020202020204" pitchFamily="34" charset="0"/>
+              </a:rPr>
+              <a:t> </a:t>
+            </a:r>
+            <a:r>
+              <a:rPr lang="en-US" sz="2000" dirty="0" err="1">
+                <a:latin typeface="helvetica" panose="020B0604020202020204" pitchFamily="34" charset="0"/>
+                <a:cs typeface="helvetica" panose="020B0604020202020204" pitchFamily="34" charset="0"/>
+              </a:rPr>
+              <a:t>i</a:t>
+            </a:r>
+            <a:r>
+              <a:rPr lang="en-US" sz="2000" dirty="0">
+                <a:latin typeface="helvetica" panose="020B0604020202020204" pitchFamily="34" charset="0"/>
+                <a:cs typeface="helvetica" panose="020B0604020202020204" pitchFamily="34" charset="0"/>
+              </a:rPr>
+              <a:t> </a:t>
+            </a:r>
+            <a:r>
+              <a:rPr lang="en-US" sz="2000" dirty="0" err="1">
+                <a:latin typeface="helvetica" panose="020B0604020202020204" pitchFamily="34" charset="0"/>
+                <a:cs typeface="helvetica" panose="020B0604020202020204" pitchFamily="34" charset="0"/>
+              </a:rPr>
+              <a:t>testiranju</a:t>
+            </a:r>
+            <a:r>
+              <a:rPr lang="en-US" sz="2000" dirty="0">
+                <a:latin typeface="helvetica" panose="020B0604020202020204" pitchFamily="34" charset="0"/>
+                <a:cs typeface="helvetica" panose="020B0604020202020204" pitchFamily="34" charset="0"/>
+              </a:rPr>
+              <a:t> </a:t>
+            </a:r>
+            <a:r>
+              <a:rPr lang="en-US" sz="2000" dirty="0" err="1">
+                <a:latin typeface="helvetica" panose="020B0604020202020204" pitchFamily="34" charset="0"/>
+                <a:cs typeface="helvetica" panose="020B0604020202020204" pitchFamily="34" charset="0"/>
+              </a:rPr>
+              <a:t>kako</a:t>
+            </a:r>
+            <a:r>
+              <a:rPr lang="en-US" sz="2000" dirty="0">
+                <a:latin typeface="helvetica" panose="020B0604020202020204" pitchFamily="34" charset="0"/>
+                <a:cs typeface="helvetica" panose="020B0604020202020204" pitchFamily="34" charset="0"/>
+              </a:rPr>
+              <a:t> bi se </a:t>
+            </a:r>
+            <a:r>
+              <a:rPr lang="en-US" sz="2000" dirty="0" err="1">
+                <a:latin typeface="helvetica" panose="020B0604020202020204" pitchFamily="34" charset="0"/>
+                <a:cs typeface="helvetica" panose="020B0604020202020204" pitchFamily="34" charset="0"/>
+              </a:rPr>
+              <a:t>svi</a:t>
+            </a:r>
+            <a:r>
+              <a:rPr lang="en-US" sz="2000" dirty="0">
+                <a:latin typeface="helvetica" panose="020B0604020202020204" pitchFamily="34" charset="0"/>
+                <a:cs typeface="helvetica" panose="020B0604020202020204" pitchFamily="34" charset="0"/>
+              </a:rPr>
+              <a:t> </a:t>
+            </a:r>
+            <a:r>
+              <a:rPr lang="en-US" sz="2000" dirty="0" err="1">
+                <a:latin typeface="helvetica" panose="020B0604020202020204" pitchFamily="34" charset="0"/>
+                <a:cs typeface="helvetica" panose="020B0604020202020204" pitchFamily="34" charset="0"/>
+              </a:rPr>
+              <a:t>mogli</a:t>
+            </a:r>
+            <a:r>
+              <a:rPr lang="en-US" sz="2000" dirty="0">
+                <a:latin typeface="helvetica" panose="020B0604020202020204" pitchFamily="34" charset="0"/>
+                <a:cs typeface="helvetica" panose="020B0604020202020204" pitchFamily="34" charset="0"/>
+              </a:rPr>
+              <a:t> </a:t>
+            </a:r>
+            <a:r>
+              <a:rPr lang="en-US" sz="2000" dirty="0" err="1">
+                <a:latin typeface="helvetica" panose="020B0604020202020204" pitchFamily="34" charset="0"/>
+                <a:cs typeface="helvetica" panose="020B0604020202020204" pitchFamily="34" charset="0"/>
+              </a:rPr>
+              <a:t>upoznati</a:t>
+            </a:r>
+            <a:r>
+              <a:rPr lang="en-US" sz="2000" dirty="0">
+                <a:latin typeface="helvetica" panose="020B0604020202020204" pitchFamily="34" charset="0"/>
+                <a:cs typeface="helvetica" panose="020B0604020202020204" pitchFamily="34" charset="0"/>
+              </a:rPr>
+              <a:t> </a:t>
+            </a:r>
+            <a:r>
+              <a:rPr lang="en-US" sz="2000" dirty="0" err="1">
+                <a:latin typeface="helvetica" panose="020B0604020202020204" pitchFamily="34" charset="0"/>
+                <a:cs typeface="helvetica" panose="020B0604020202020204" pitchFamily="34" charset="0"/>
+              </a:rPr>
+              <a:t>sa</a:t>
+            </a:r>
+            <a:r>
+              <a:rPr lang="en-US" sz="2000" dirty="0">
+                <a:latin typeface="helvetica" panose="020B0604020202020204" pitchFamily="34" charset="0"/>
+                <a:cs typeface="helvetica" panose="020B0604020202020204" pitchFamily="34" charset="0"/>
+              </a:rPr>
+              <a:t> </a:t>
+            </a:r>
+            <a:r>
+              <a:rPr lang="en-US" sz="2000" dirty="0" err="1">
+                <a:latin typeface="helvetica" panose="020B0604020202020204" pitchFamily="34" charset="0"/>
+                <a:cs typeface="helvetica" panose="020B0604020202020204" pitchFamily="34" charset="0"/>
+              </a:rPr>
+              <a:t>svim</a:t>
+            </a:r>
+            <a:r>
+              <a:rPr lang="en-US" sz="2000" dirty="0">
+                <a:latin typeface="helvetica" panose="020B0604020202020204" pitchFamily="34" charset="0"/>
+                <a:cs typeface="helvetica" panose="020B0604020202020204" pitchFamily="34" charset="0"/>
+              </a:rPr>
+              <a:t> </a:t>
+            </a:r>
+            <a:r>
+              <a:rPr lang="en-US" sz="2000" dirty="0" err="1">
+                <a:latin typeface="helvetica" panose="020B0604020202020204" pitchFamily="34" charset="0"/>
+                <a:cs typeface="helvetica" panose="020B0604020202020204" pitchFamily="34" charset="0"/>
+              </a:rPr>
+              <a:t>aktivnostima</a:t>
+            </a:r>
+            <a:endParaRPr lang="hr-HR" sz="2000" dirty="0">
+              <a:latin typeface="helvetica" panose="020B0604020202020204" pitchFamily="34" charset="0"/>
+              <a:cs typeface="helvetica" panose="020B0604020202020204" pitchFamily="34" charset="0"/>
+            </a:endParaRPr>
+          </a:p>
+        </p:txBody>
+      </p:sp>
+    </p:spTree>
+    <p:extLst>
+      <p:ext uri="{BB962C8B-B14F-4D97-AF65-F5344CB8AC3E}">
+        <p14:creationId xmlns:p14="http://schemas.microsoft.com/office/powerpoint/2010/main" val="165291248"/>
+      </p:ext>
+    </p:extLst>
+  </p:cSld>
+  <p:clrMapOvr>
+    <a:masterClrMapping/>
+  </p:clrMapOvr>
+</p:sld>
+</file>
+
+<file path=ppt/slides/slide11.xml><?xml version="1.0" encoding="utf-8"?>
+<p:sld xmlns:a="http://schemas.openxmlformats.org/drawingml/2006/main" xmlns:r="http://schemas.openxmlformats.org/officeDocument/2006/relationships" xmlns:p="http://schemas.openxmlformats.org/presentationml/2006/main">
+  <p:cSld>
+    <p:spTree>
+      <p:nvGrpSpPr>
+        <p:cNvPr id="1" name=""/>
+        <p:cNvGrpSpPr/>
+        <p:nvPr/>
+      </p:nvGrpSpPr>
+      <p:grpSpPr>
+        <a:xfrm>
+          <a:off x="0" y="0"/>
+          <a:ext cx="0" cy="0"/>
+          <a:chOff x="0" y="0"/>
+          <a:chExt cx="0" cy="0"/>
+        </a:xfrm>
+      </p:grpSpPr>
+      <p:sp>
+        <p:nvSpPr>
+          <p:cNvPr id="2" name="Title 1">
+            <a:extLst>
+              <a:ext uri="{FF2B5EF4-FFF2-40B4-BE49-F238E27FC236}">
                 <a16:creationId xmlns:a16="http://schemas.microsoft.com/office/drawing/2014/main" id="{68E98789-5B05-4E78-9A40-1531764920D3}"/>
               </a:ext>
             </a:extLst>
@@ -4127,8 +4493,8 @@
         </p:nvSpPr>
         <p:spPr>
           <a:xfrm>
-            <a:off x="634424" y="1922719"/>
-            <a:ext cx="7391401" cy="4023360"/>
+            <a:off x="699796" y="1819469"/>
+            <a:ext cx="7326029" cy="4497354"/>
           </a:xfrm>
           <a:prstGeom prst="rect">
             <a:avLst/>
@@ -4390,12 +4756,295 @@
               <a:buChar char="§"/>
             </a:pPr>
             <a:r>
-              <a:rPr lang="hr-HR" sz="2400" dirty="0">
+              <a:rPr lang="hr-HR" sz="2000" dirty="0">
                 <a:latin typeface="helvetica" panose="020B0604020202020204" pitchFamily="34" charset="0"/>
                 <a:cs typeface="helvetica" panose="020B0604020202020204" pitchFamily="34" charset="0"/>
               </a:rPr>
               <a:t>Timski rad u grupi od više članova</a:t>
             </a:r>
+            <a:r>
+              <a:rPr lang="en-US" sz="2000" dirty="0">
+                <a:latin typeface="helvetica" panose="020B0604020202020204" pitchFamily="34" charset="0"/>
+                <a:cs typeface="helvetica" panose="020B0604020202020204" pitchFamily="34" charset="0"/>
+              </a:rPr>
+              <a:t> </a:t>
+            </a:r>
+            <a:r>
+              <a:rPr lang="en-US" sz="2000" dirty="0" err="1">
+                <a:latin typeface="helvetica" panose="020B0604020202020204" pitchFamily="34" charset="0"/>
+                <a:cs typeface="helvetica" panose="020B0604020202020204" pitchFamily="34" charset="0"/>
+              </a:rPr>
+              <a:t>nije</a:t>
+            </a:r>
+            <a:r>
+              <a:rPr lang="en-US" sz="2000" dirty="0">
+                <a:latin typeface="helvetica" panose="020B0604020202020204" pitchFamily="34" charset="0"/>
+                <a:cs typeface="helvetica" panose="020B0604020202020204" pitchFamily="34" charset="0"/>
+              </a:rPr>
+              <a:t> </a:t>
+            </a:r>
+            <a:r>
+              <a:rPr lang="en-US" sz="2000" dirty="0" err="1">
+                <a:latin typeface="helvetica" panose="020B0604020202020204" pitchFamily="34" charset="0"/>
+                <a:cs typeface="helvetica" panose="020B0604020202020204" pitchFamily="34" charset="0"/>
+              </a:rPr>
+              <a:t>jednostavan</a:t>
+            </a:r>
+            <a:endParaRPr lang="en-US" sz="2000" dirty="0">
+              <a:latin typeface="helvetica" panose="020B0604020202020204" pitchFamily="34" charset="0"/>
+              <a:cs typeface="helvetica" panose="020B0604020202020204" pitchFamily="34" charset="0"/>
+            </a:endParaRPr>
+          </a:p>
+          <a:p>
+            <a:pPr lvl="2">
+              <a:buFont typeface="Wingdings" panose="05000000000000000000" pitchFamily="2" charset="2"/>
+              <a:buChar char="§"/>
+            </a:pPr>
+            <a:r>
+              <a:rPr lang="en-US" sz="1600" dirty="0" err="1">
+                <a:latin typeface="helvetica" panose="020B0604020202020204" pitchFamily="34" charset="0"/>
+                <a:cs typeface="helvetica" panose="020B0604020202020204" pitchFamily="34" charset="0"/>
+              </a:rPr>
+              <a:t>Potrebna</a:t>
+            </a:r>
+            <a:r>
+              <a:rPr lang="en-US" sz="1600" dirty="0">
+                <a:latin typeface="helvetica" panose="020B0604020202020204" pitchFamily="34" charset="0"/>
+                <a:cs typeface="helvetica" panose="020B0604020202020204" pitchFamily="34" charset="0"/>
+              </a:rPr>
+              <a:t> je dobra </a:t>
+            </a:r>
+            <a:r>
+              <a:rPr lang="en-US" sz="1600" dirty="0" err="1">
+                <a:latin typeface="helvetica" panose="020B0604020202020204" pitchFamily="34" charset="0"/>
+                <a:cs typeface="helvetica" panose="020B0604020202020204" pitchFamily="34" charset="0"/>
+              </a:rPr>
+              <a:t>koordinacija</a:t>
+            </a:r>
+            <a:r>
+              <a:rPr lang="en-US" sz="1600" dirty="0">
+                <a:latin typeface="helvetica" panose="020B0604020202020204" pitchFamily="34" charset="0"/>
+                <a:cs typeface="helvetica" panose="020B0604020202020204" pitchFamily="34" charset="0"/>
+              </a:rPr>
+              <a:t>, </a:t>
+            </a:r>
+            <a:r>
+              <a:rPr lang="en-US" sz="1600" dirty="0" err="1">
+                <a:latin typeface="helvetica" panose="020B0604020202020204" pitchFamily="34" charset="0"/>
+                <a:cs typeface="helvetica" panose="020B0604020202020204" pitchFamily="34" charset="0"/>
+              </a:rPr>
+              <a:t>redoviti</a:t>
+            </a:r>
+            <a:r>
+              <a:rPr lang="en-US" sz="1600" dirty="0">
+                <a:latin typeface="helvetica" panose="020B0604020202020204" pitchFamily="34" charset="0"/>
+                <a:cs typeface="helvetica" panose="020B0604020202020204" pitchFamily="34" charset="0"/>
+              </a:rPr>
+              <a:t> </a:t>
+            </a:r>
+            <a:r>
+              <a:rPr lang="en-US" sz="1600" dirty="0" err="1">
+                <a:latin typeface="helvetica" panose="020B0604020202020204" pitchFamily="34" charset="0"/>
+                <a:cs typeface="helvetica" panose="020B0604020202020204" pitchFamily="34" charset="0"/>
+              </a:rPr>
+              <a:t>sastanci</a:t>
+            </a:r>
+            <a:r>
+              <a:rPr lang="en-US" sz="1600" dirty="0">
+                <a:latin typeface="helvetica" panose="020B0604020202020204" pitchFamily="34" charset="0"/>
+                <a:cs typeface="helvetica" panose="020B0604020202020204" pitchFamily="34" charset="0"/>
+              </a:rPr>
+              <a:t> </a:t>
+            </a:r>
+            <a:r>
+              <a:rPr lang="en-US" sz="1600" dirty="0" err="1">
+                <a:latin typeface="helvetica" panose="020B0604020202020204" pitchFamily="34" charset="0"/>
+                <a:cs typeface="helvetica" panose="020B0604020202020204" pitchFamily="34" charset="0"/>
+              </a:rPr>
+              <a:t>i</a:t>
+            </a:r>
+            <a:r>
+              <a:rPr lang="en-US" sz="1600" dirty="0">
+                <a:latin typeface="helvetica" panose="020B0604020202020204" pitchFamily="34" charset="0"/>
+                <a:cs typeface="helvetica" panose="020B0604020202020204" pitchFamily="34" charset="0"/>
+              </a:rPr>
+              <a:t> </a:t>
+            </a:r>
+            <a:r>
+              <a:rPr lang="en-US" sz="1600" dirty="0" err="1">
+                <a:latin typeface="helvetica" panose="020B0604020202020204" pitchFamily="34" charset="0"/>
+                <a:cs typeface="helvetica" panose="020B0604020202020204" pitchFamily="34" charset="0"/>
+              </a:rPr>
+              <a:t>komunikacija</a:t>
+            </a:r>
+            <a:r>
+              <a:rPr lang="en-US" sz="1600" dirty="0">
+                <a:latin typeface="helvetica" panose="020B0604020202020204" pitchFamily="34" charset="0"/>
+                <a:cs typeface="helvetica" panose="020B0604020202020204" pitchFamily="34" charset="0"/>
+              </a:rPr>
+              <a:t> </a:t>
+            </a:r>
+            <a:r>
+              <a:rPr lang="en-US" sz="1600" dirty="0" err="1">
+                <a:latin typeface="helvetica" panose="020B0604020202020204" pitchFamily="34" charset="0"/>
+                <a:cs typeface="helvetica" panose="020B0604020202020204" pitchFamily="34" charset="0"/>
+              </a:rPr>
+              <a:t>oko</a:t>
+            </a:r>
+            <a:r>
+              <a:rPr lang="en-US" sz="1600" dirty="0">
+                <a:latin typeface="helvetica" panose="020B0604020202020204" pitchFamily="34" charset="0"/>
+                <a:cs typeface="helvetica" panose="020B0604020202020204" pitchFamily="34" charset="0"/>
+              </a:rPr>
+              <a:t> </a:t>
+            </a:r>
+            <a:r>
+              <a:rPr lang="en-US" sz="1600" dirty="0" err="1">
+                <a:latin typeface="helvetica" panose="020B0604020202020204" pitchFamily="34" charset="0"/>
+                <a:cs typeface="helvetica" panose="020B0604020202020204" pitchFamily="34" charset="0"/>
+              </a:rPr>
+              <a:t>trenutnom</a:t>
+            </a:r>
+            <a:r>
+              <a:rPr lang="en-US" sz="1600" dirty="0">
+                <a:latin typeface="helvetica" panose="020B0604020202020204" pitchFamily="34" charset="0"/>
+                <a:cs typeface="helvetica" panose="020B0604020202020204" pitchFamily="34" charset="0"/>
+              </a:rPr>
+              <a:t> </a:t>
+            </a:r>
+            <a:r>
+              <a:rPr lang="en-US" sz="1600" dirty="0" err="1">
+                <a:latin typeface="helvetica" panose="020B0604020202020204" pitchFamily="34" charset="0"/>
+                <a:cs typeface="helvetica" panose="020B0604020202020204" pitchFamily="34" charset="0"/>
+              </a:rPr>
+              <a:t>stanja</a:t>
+            </a:r>
+            <a:r>
+              <a:rPr lang="en-US" sz="1600" dirty="0">
+                <a:latin typeface="helvetica" panose="020B0604020202020204" pitchFamily="34" charset="0"/>
+                <a:cs typeface="helvetica" panose="020B0604020202020204" pitchFamily="34" charset="0"/>
+              </a:rPr>
+              <a:t> </a:t>
+            </a:r>
+            <a:r>
+              <a:rPr lang="en-US" sz="1600" dirty="0" err="1">
+                <a:latin typeface="helvetica" panose="020B0604020202020204" pitchFamily="34" charset="0"/>
+                <a:cs typeface="helvetica" panose="020B0604020202020204" pitchFamily="34" charset="0"/>
+              </a:rPr>
+              <a:t>i</a:t>
+            </a:r>
+            <a:r>
+              <a:rPr lang="en-US" sz="1600" dirty="0">
+                <a:latin typeface="helvetica" panose="020B0604020202020204" pitchFamily="34" charset="0"/>
+                <a:cs typeface="helvetica" panose="020B0604020202020204" pitchFamily="34" charset="0"/>
+              </a:rPr>
+              <a:t> </a:t>
+            </a:r>
+            <a:r>
+              <a:rPr lang="en-US" sz="1600" dirty="0" err="1">
+                <a:latin typeface="helvetica" panose="020B0604020202020204" pitchFamily="34" charset="0"/>
+                <a:cs typeface="helvetica" panose="020B0604020202020204" pitchFamily="34" charset="0"/>
+              </a:rPr>
+              <a:t>budućih</a:t>
+            </a:r>
+            <a:r>
+              <a:rPr lang="en-US" sz="1600" dirty="0">
+                <a:latin typeface="helvetica" panose="020B0604020202020204" pitchFamily="34" charset="0"/>
+                <a:cs typeface="helvetica" panose="020B0604020202020204" pitchFamily="34" charset="0"/>
+              </a:rPr>
+              <a:t> </a:t>
+            </a:r>
+            <a:r>
+              <a:rPr lang="en-US" sz="1600" dirty="0" err="1">
+                <a:latin typeface="helvetica" panose="020B0604020202020204" pitchFamily="34" charset="0"/>
+                <a:cs typeface="helvetica" panose="020B0604020202020204" pitchFamily="34" charset="0"/>
+              </a:rPr>
+              <a:t>poslova</a:t>
+            </a:r>
+            <a:endParaRPr lang="en-US" sz="1600" dirty="0">
+              <a:latin typeface="helvetica" panose="020B0604020202020204" pitchFamily="34" charset="0"/>
+              <a:cs typeface="helvetica" panose="020B0604020202020204" pitchFamily="34" charset="0"/>
+            </a:endParaRPr>
+          </a:p>
+          <a:p>
+            <a:pPr lvl="2">
+              <a:buFont typeface="Wingdings" panose="05000000000000000000" pitchFamily="2" charset="2"/>
+              <a:buChar char="§"/>
+            </a:pPr>
+            <a:r>
+              <a:rPr lang="en-US" sz="1600" dirty="0">
+                <a:latin typeface="helvetica" panose="020B0604020202020204" pitchFamily="34" charset="0"/>
+                <a:cs typeface="helvetica" panose="020B0604020202020204" pitchFamily="34" charset="0"/>
+              </a:rPr>
+              <a:t>Problem </a:t>
+            </a:r>
+            <a:r>
+              <a:rPr lang="en-US" sz="1600" dirty="0" err="1">
+                <a:latin typeface="helvetica" panose="020B0604020202020204" pitchFamily="34" charset="0"/>
+                <a:cs typeface="helvetica" panose="020B0604020202020204" pitchFamily="34" charset="0"/>
+              </a:rPr>
+              <a:t>su</a:t>
+            </a:r>
+            <a:r>
+              <a:rPr lang="en-US" sz="1600" dirty="0">
+                <a:latin typeface="helvetica" panose="020B0604020202020204" pitchFamily="34" charset="0"/>
+                <a:cs typeface="helvetica" panose="020B0604020202020204" pitchFamily="34" charset="0"/>
+              </a:rPr>
+              <a:t> </a:t>
+            </a:r>
+            <a:r>
+              <a:rPr lang="en-US" sz="1600" dirty="0" err="1">
+                <a:latin typeface="helvetica" panose="020B0604020202020204" pitchFamily="34" charset="0"/>
+                <a:cs typeface="helvetica" panose="020B0604020202020204" pitchFamily="34" charset="0"/>
+              </a:rPr>
+              <a:t>također</a:t>
+            </a:r>
+            <a:r>
+              <a:rPr lang="en-US" sz="1600" dirty="0">
+                <a:latin typeface="helvetica" panose="020B0604020202020204" pitchFamily="34" charset="0"/>
+                <a:cs typeface="helvetica" panose="020B0604020202020204" pitchFamily="34" charset="0"/>
+              </a:rPr>
+              <a:t> </a:t>
+            </a:r>
+            <a:r>
+              <a:rPr lang="en-US" sz="1600" dirty="0" err="1">
+                <a:latin typeface="helvetica" panose="020B0604020202020204" pitchFamily="34" charset="0"/>
+                <a:cs typeface="helvetica" panose="020B0604020202020204" pitchFamily="34" charset="0"/>
+              </a:rPr>
+              <a:t>različite</a:t>
+            </a:r>
+            <a:r>
+              <a:rPr lang="en-US" sz="1600" dirty="0">
+                <a:latin typeface="helvetica" panose="020B0604020202020204" pitchFamily="34" charset="0"/>
+                <a:cs typeface="helvetica" panose="020B0604020202020204" pitchFamily="34" charset="0"/>
+              </a:rPr>
+              <a:t> </a:t>
+            </a:r>
+            <a:r>
+              <a:rPr lang="en-US" sz="1600" dirty="0" err="1">
+                <a:latin typeface="helvetica" panose="020B0604020202020204" pitchFamily="34" charset="0"/>
+                <a:cs typeface="helvetica" panose="020B0604020202020204" pitchFamily="34" charset="0"/>
+              </a:rPr>
+              <a:t>razine</a:t>
+            </a:r>
+            <a:r>
+              <a:rPr lang="en-US" sz="1600" dirty="0">
+                <a:latin typeface="helvetica" panose="020B0604020202020204" pitchFamily="34" charset="0"/>
+                <a:cs typeface="helvetica" panose="020B0604020202020204" pitchFamily="34" charset="0"/>
+              </a:rPr>
+              <a:t> </a:t>
+            </a:r>
+            <a:r>
+              <a:rPr lang="en-US" sz="1600" dirty="0" err="1">
+                <a:latin typeface="helvetica" panose="020B0604020202020204" pitchFamily="34" charset="0"/>
+                <a:cs typeface="helvetica" panose="020B0604020202020204" pitchFamily="34" charset="0"/>
+              </a:rPr>
+              <a:t>predznanja</a:t>
+            </a:r>
+            <a:endParaRPr lang="en-US" sz="1600" dirty="0">
+              <a:latin typeface="helvetica" panose="020B0604020202020204" pitchFamily="34" charset="0"/>
+              <a:cs typeface="helvetica" panose="020B0604020202020204" pitchFamily="34" charset="0"/>
+            </a:endParaRPr>
           </a:p>
           <a:p>
             <a:pPr lvl="1">
@@ -4403,12 +5052,271 @@
               <a:buChar char="§"/>
             </a:pPr>
             <a:r>
-              <a:rPr lang="hr-HR" sz="2400" dirty="0">
-                <a:latin typeface="helvetica" panose="020B0604020202020204" pitchFamily="34" charset="0"/>
-                <a:cs typeface="helvetica" panose="020B0604020202020204" pitchFamily="34" charset="0"/>
-              </a:rPr>
-              <a:t>Upoznavanje s raznovrsnim programskim alatima</a:t>
-            </a:r>
+              <a:rPr lang="en-US" sz="2000" dirty="0" err="1">
+                <a:latin typeface="helvetica" panose="020B0604020202020204" pitchFamily="34" charset="0"/>
+                <a:cs typeface="helvetica" panose="020B0604020202020204" pitchFamily="34" charset="0"/>
+              </a:rPr>
+              <a:t>Pokušaj</a:t>
+            </a:r>
+            <a:r>
+              <a:rPr lang="en-US" sz="2000" dirty="0">
+                <a:latin typeface="helvetica" panose="020B0604020202020204" pitchFamily="34" charset="0"/>
+                <a:cs typeface="helvetica" panose="020B0604020202020204" pitchFamily="34" charset="0"/>
+              </a:rPr>
+              <a:t> </a:t>
+            </a:r>
+            <a:r>
+              <a:rPr lang="en-US" sz="2000" dirty="0" err="1">
+                <a:latin typeface="helvetica" panose="020B0604020202020204" pitchFamily="34" charset="0"/>
+                <a:cs typeface="helvetica" panose="020B0604020202020204" pitchFamily="34" charset="0"/>
+              </a:rPr>
+              <a:t>prelaska</a:t>
+            </a:r>
+            <a:r>
+              <a:rPr lang="en-US" sz="2000" dirty="0">
+                <a:latin typeface="helvetica" panose="020B0604020202020204" pitchFamily="34" charset="0"/>
+                <a:cs typeface="helvetica" panose="020B0604020202020204" pitchFamily="34" charset="0"/>
+              </a:rPr>
+              <a:t> </a:t>
+            </a:r>
+            <a:r>
+              <a:rPr lang="en-US" sz="2000" dirty="0" err="1">
+                <a:latin typeface="helvetica" panose="020B0604020202020204" pitchFamily="34" charset="0"/>
+                <a:cs typeface="helvetica" panose="020B0604020202020204" pitchFamily="34" charset="0"/>
+              </a:rPr>
+              <a:t>na</a:t>
+            </a:r>
+            <a:r>
+              <a:rPr lang="en-US" sz="2000" dirty="0">
+                <a:latin typeface="helvetica" panose="020B0604020202020204" pitchFamily="34" charset="0"/>
+                <a:cs typeface="helvetica" panose="020B0604020202020204" pitchFamily="34" charset="0"/>
+              </a:rPr>
+              <a:t> React </a:t>
+            </a:r>
+            <a:r>
+              <a:rPr lang="en-US" sz="2000" dirty="0" err="1">
+                <a:latin typeface="helvetica" panose="020B0604020202020204" pitchFamily="34" charset="0"/>
+                <a:cs typeface="helvetica" panose="020B0604020202020204" pitchFamily="34" charset="0"/>
+              </a:rPr>
+              <a:t>nakon</a:t>
+            </a:r>
+            <a:r>
+              <a:rPr lang="en-US" sz="2000" dirty="0">
+                <a:latin typeface="helvetica" panose="020B0604020202020204" pitchFamily="34" charset="0"/>
+                <a:cs typeface="helvetica" panose="020B0604020202020204" pitchFamily="34" charset="0"/>
+              </a:rPr>
+              <a:t> </a:t>
+            </a:r>
+            <a:r>
+              <a:rPr lang="en-US" sz="2000" dirty="0" err="1">
+                <a:latin typeface="helvetica" panose="020B0604020202020204" pitchFamily="34" charset="0"/>
+                <a:cs typeface="helvetica" panose="020B0604020202020204" pitchFamily="34" charset="0"/>
+              </a:rPr>
+              <a:t>završetka</a:t>
+            </a:r>
+            <a:r>
+              <a:rPr lang="en-US" sz="2000" dirty="0">
+                <a:latin typeface="helvetica" panose="020B0604020202020204" pitchFamily="34" charset="0"/>
+                <a:cs typeface="helvetica" panose="020B0604020202020204" pitchFamily="34" charset="0"/>
+              </a:rPr>
+              <a:t> </a:t>
+            </a:r>
+            <a:r>
+              <a:rPr lang="en-US" sz="2000" dirty="0" err="1">
+                <a:latin typeface="helvetica" panose="020B0604020202020204" pitchFamily="34" charset="0"/>
+                <a:cs typeface="helvetica" panose="020B0604020202020204" pitchFamily="34" charset="0"/>
+              </a:rPr>
+              <a:t>implementacije</a:t>
+            </a:r>
+            <a:r>
+              <a:rPr lang="en-US" sz="2000" dirty="0">
+                <a:latin typeface="helvetica" panose="020B0604020202020204" pitchFamily="34" charset="0"/>
+                <a:cs typeface="helvetica" panose="020B0604020202020204" pitchFamily="34" charset="0"/>
+              </a:rPr>
+              <a:t> </a:t>
+            </a:r>
+            <a:r>
+              <a:rPr lang="en-US" sz="2000" dirty="0" err="1">
+                <a:latin typeface="helvetica" panose="020B0604020202020204" pitchFamily="34" charset="0"/>
+                <a:cs typeface="helvetica" panose="020B0604020202020204" pitchFamily="34" charset="0"/>
+              </a:rPr>
+              <a:t>generičkih</a:t>
+            </a:r>
+            <a:r>
+              <a:rPr lang="en-US" sz="2000" dirty="0">
+                <a:latin typeface="helvetica" panose="020B0604020202020204" pitchFamily="34" charset="0"/>
+                <a:cs typeface="helvetica" panose="020B0604020202020204" pitchFamily="34" charset="0"/>
+              </a:rPr>
+              <a:t> </a:t>
+            </a:r>
+            <a:r>
+              <a:rPr lang="en-US" sz="2000" dirty="0" err="1">
+                <a:latin typeface="helvetica" panose="020B0604020202020204" pitchFamily="34" charset="0"/>
+                <a:cs typeface="helvetica" panose="020B0604020202020204" pitchFamily="34" charset="0"/>
+              </a:rPr>
+              <a:t>funkcionalnosti</a:t>
+            </a:r>
+            <a:endParaRPr lang="en-US" sz="2000" dirty="0">
+              <a:latin typeface="helvetica" panose="020B0604020202020204" pitchFamily="34" charset="0"/>
+              <a:cs typeface="helvetica" panose="020B0604020202020204" pitchFamily="34" charset="0"/>
+            </a:endParaRPr>
+          </a:p>
+          <a:p>
+            <a:pPr lvl="2">
+              <a:buFont typeface="Wingdings" panose="05000000000000000000" pitchFamily="2" charset="2"/>
+              <a:buChar char="§"/>
+            </a:pPr>
+            <a:r>
+              <a:rPr lang="en-US" sz="1600" dirty="0" err="1">
+                <a:latin typeface="helvetica" panose="020B0604020202020204" pitchFamily="34" charset="0"/>
+                <a:cs typeface="helvetica" panose="020B0604020202020204" pitchFamily="34" charset="0"/>
+              </a:rPr>
+              <a:t>Nakon</a:t>
+            </a:r>
+            <a:r>
+              <a:rPr lang="en-US" sz="1600" dirty="0">
+                <a:latin typeface="helvetica" panose="020B0604020202020204" pitchFamily="34" charset="0"/>
+                <a:cs typeface="helvetica" panose="020B0604020202020204" pitchFamily="34" charset="0"/>
+              </a:rPr>
+              <a:t> </a:t>
+            </a:r>
+            <a:r>
+              <a:rPr lang="en-US" sz="1600" dirty="0" err="1">
+                <a:latin typeface="helvetica" panose="020B0604020202020204" pitchFamily="34" charset="0"/>
+                <a:cs typeface="helvetica" panose="020B0604020202020204" pitchFamily="34" charset="0"/>
+              </a:rPr>
+              <a:t>napisanog</a:t>
+            </a:r>
+            <a:r>
+              <a:rPr lang="en-US" sz="1600" dirty="0">
+                <a:latin typeface="helvetica" panose="020B0604020202020204" pitchFamily="34" charset="0"/>
+                <a:cs typeface="helvetica" panose="020B0604020202020204" pitchFamily="34" charset="0"/>
+              </a:rPr>
+              <a:t> </a:t>
+            </a:r>
+            <a:r>
+              <a:rPr lang="en-US" sz="1600" dirty="0" err="1">
+                <a:latin typeface="helvetica" panose="020B0604020202020204" pitchFamily="34" charset="0"/>
+                <a:cs typeface="helvetica" panose="020B0604020202020204" pitchFamily="34" charset="0"/>
+              </a:rPr>
+              <a:t>dijela</a:t>
+            </a:r>
+            <a:r>
+              <a:rPr lang="en-US" sz="1600" dirty="0">
+                <a:latin typeface="helvetica" panose="020B0604020202020204" pitchFamily="34" charset="0"/>
+                <a:cs typeface="helvetica" panose="020B0604020202020204" pitchFamily="34" charset="0"/>
+              </a:rPr>
+              <a:t> </a:t>
+            </a:r>
+            <a:r>
+              <a:rPr lang="en-US" sz="1600" dirty="0" err="1">
+                <a:latin typeface="helvetica" panose="020B0604020202020204" pitchFamily="34" charset="0"/>
+                <a:cs typeface="helvetica" panose="020B0604020202020204" pitchFamily="34" charset="0"/>
+              </a:rPr>
+              <a:t>koda</a:t>
+            </a:r>
+            <a:r>
+              <a:rPr lang="en-US" sz="1600" dirty="0">
+                <a:latin typeface="helvetica" panose="020B0604020202020204" pitchFamily="34" charset="0"/>
+                <a:cs typeface="helvetica" panose="020B0604020202020204" pitchFamily="34" charset="0"/>
+              </a:rPr>
+              <a:t>, </a:t>
+            </a:r>
+            <a:r>
+              <a:rPr lang="en-US" sz="1600" dirty="0" err="1">
+                <a:latin typeface="helvetica" panose="020B0604020202020204" pitchFamily="34" charset="0"/>
+                <a:cs typeface="helvetica" panose="020B0604020202020204" pitchFamily="34" charset="0"/>
+              </a:rPr>
+              <a:t>pokazalo</a:t>
+            </a:r>
+            <a:r>
+              <a:rPr lang="en-US" sz="1600" dirty="0">
+                <a:latin typeface="helvetica" panose="020B0604020202020204" pitchFamily="34" charset="0"/>
+                <a:cs typeface="helvetica" panose="020B0604020202020204" pitchFamily="34" charset="0"/>
+              </a:rPr>
+              <a:t> se </a:t>
+            </a:r>
+            <a:r>
+              <a:rPr lang="en-US" sz="1600" dirty="0" err="1">
+                <a:latin typeface="helvetica" panose="020B0604020202020204" pitchFamily="34" charset="0"/>
+                <a:cs typeface="helvetica" panose="020B0604020202020204" pitchFamily="34" charset="0"/>
+              </a:rPr>
+              <a:t>kao</a:t>
+            </a:r>
+            <a:r>
+              <a:rPr lang="en-US" sz="1600" dirty="0">
+                <a:latin typeface="helvetica" panose="020B0604020202020204" pitchFamily="34" charset="0"/>
+                <a:cs typeface="helvetica" panose="020B0604020202020204" pitchFamily="34" charset="0"/>
+              </a:rPr>
+              <a:t> </a:t>
+            </a:r>
+            <a:r>
+              <a:rPr lang="en-US" sz="1600" dirty="0" err="1">
+                <a:latin typeface="helvetica" panose="020B0604020202020204" pitchFamily="34" charset="0"/>
+                <a:cs typeface="helvetica" panose="020B0604020202020204" pitchFamily="34" charset="0"/>
+              </a:rPr>
+              <a:t>loša</a:t>
+            </a:r>
+            <a:r>
+              <a:rPr lang="en-US" sz="1600" dirty="0">
+                <a:latin typeface="helvetica" panose="020B0604020202020204" pitchFamily="34" charset="0"/>
+                <a:cs typeface="helvetica" panose="020B0604020202020204" pitchFamily="34" charset="0"/>
+              </a:rPr>
+              <a:t> </a:t>
+            </a:r>
+            <a:r>
+              <a:rPr lang="en-US" sz="1600" dirty="0" err="1">
+                <a:latin typeface="helvetica" panose="020B0604020202020204" pitchFamily="34" charset="0"/>
+                <a:cs typeface="helvetica" panose="020B0604020202020204" pitchFamily="34" charset="0"/>
+              </a:rPr>
+              <a:t>ideja</a:t>
+            </a:r>
+            <a:r>
+              <a:rPr lang="en-US" sz="1600" dirty="0">
+                <a:latin typeface="helvetica" panose="020B0604020202020204" pitchFamily="34" charset="0"/>
+                <a:cs typeface="helvetica" panose="020B0604020202020204" pitchFamily="34" charset="0"/>
+              </a:rPr>
+              <a:t> </a:t>
+            </a:r>
+            <a:r>
+              <a:rPr lang="en-US" sz="1600" dirty="0" err="1">
+                <a:latin typeface="helvetica" panose="020B0604020202020204" pitchFamily="34" charset="0"/>
+                <a:cs typeface="helvetica" panose="020B0604020202020204" pitchFamily="34" charset="0"/>
+              </a:rPr>
+              <a:t>i</a:t>
+            </a:r>
+            <a:r>
+              <a:rPr lang="en-US" sz="1600" dirty="0">
+                <a:latin typeface="helvetica" panose="020B0604020202020204" pitchFamily="34" charset="0"/>
+                <a:cs typeface="helvetica" panose="020B0604020202020204" pitchFamily="34" charset="0"/>
+              </a:rPr>
+              <a:t> </a:t>
+            </a:r>
+            <a:r>
+              <a:rPr lang="en-US" sz="1600" dirty="0" err="1">
+                <a:latin typeface="helvetica" panose="020B0604020202020204" pitchFamily="34" charset="0"/>
+                <a:cs typeface="helvetica" panose="020B0604020202020204" pitchFamily="34" charset="0"/>
+              </a:rPr>
+              <a:t>završilo</a:t>
+            </a:r>
+            <a:r>
+              <a:rPr lang="en-US" sz="1600" dirty="0">
+                <a:latin typeface="helvetica" panose="020B0604020202020204" pitchFamily="34" charset="0"/>
+                <a:cs typeface="helvetica" panose="020B0604020202020204" pitchFamily="34" charset="0"/>
+              </a:rPr>
+              <a:t> </a:t>
+            </a:r>
+            <a:r>
+              <a:rPr lang="en-US" sz="1600" dirty="0" err="1">
+                <a:latin typeface="helvetica" panose="020B0604020202020204" pitchFamily="34" charset="0"/>
+                <a:cs typeface="helvetica" panose="020B0604020202020204" pitchFamily="34" charset="0"/>
+              </a:rPr>
+              <a:t>neuspješno</a:t>
+            </a:r>
+            <a:endParaRPr lang="en-US" sz="1600" dirty="0">
+              <a:latin typeface="helvetica" panose="020B0604020202020204" pitchFamily="34" charset="0"/>
+              <a:cs typeface="helvetica" panose="020B0604020202020204" pitchFamily="34" charset="0"/>
+            </a:endParaRPr>
           </a:p>
           <a:p>
             <a:pPr lvl="1">
@@ -4416,12 +5324,288 @@
               <a:buChar char="§"/>
             </a:pPr>
             <a:r>
-              <a:rPr lang="hr-HR" sz="2400" dirty="0">
-                <a:latin typeface="helvetica" panose="020B0604020202020204" pitchFamily="34" charset="0"/>
-                <a:cs typeface="helvetica" panose="020B0604020202020204" pitchFamily="34" charset="0"/>
-              </a:rPr>
-              <a:t>Integriranje modela programskog produkta uporabom standardne grafičke i matematičke notacije (UML)</a:t>
-            </a:r>
+              <a:rPr lang="en-US" sz="2000" dirty="0" err="1">
+                <a:latin typeface="helvetica" panose="020B0604020202020204" pitchFamily="34" charset="0"/>
+                <a:cs typeface="helvetica" panose="020B0604020202020204" pitchFamily="34" charset="0"/>
+              </a:rPr>
+              <a:t>Odabir</a:t>
+            </a:r>
+            <a:r>
+              <a:rPr lang="en-US" sz="2000" dirty="0">
+                <a:latin typeface="helvetica" panose="020B0604020202020204" pitchFamily="34" charset="0"/>
+                <a:cs typeface="helvetica" panose="020B0604020202020204" pitchFamily="34" charset="0"/>
+              </a:rPr>
+              <a:t> </a:t>
+            </a:r>
+            <a:r>
+              <a:rPr lang="en-US" sz="2000" dirty="0" err="1">
+                <a:latin typeface="helvetica" panose="020B0604020202020204" pitchFamily="34" charset="0"/>
+                <a:cs typeface="helvetica" panose="020B0604020202020204" pitchFamily="34" charset="0"/>
+              </a:rPr>
+              <a:t>tehnologija</a:t>
+            </a:r>
+            <a:endParaRPr lang="en-US" sz="2000" dirty="0">
+              <a:latin typeface="helvetica" panose="020B0604020202020204" pitchFamily="34" charset="0"/>
+              <a:cs typeface="helvetica" panose="020B0604020202020204" pitchFamily="34" charset="0"/>
+            </a:endParaRPr>
+          </a:p>
+          <a:p>
+            <a:pPr lvl="2">
+              <a:buFont typeface="Wingdings" panose="05000000000000000000" pitchFamily="2" charset="2"/>
+              <a:buChar char="§"/>
+            </a:pPr>
+            <a:r>
+              <a:rPr lang="en-US" sz="1600" dirty="0" err="1">
+                <a:latin typeface="helvetica" panose="020B0604020202020204" pitchFamily="34" charset="0"/>
+                <a:cs typeface="helvetica" panose="020B0604020202020204" pitchFamily="34" charset="0"/>
+              </a:rPr>
+              <a:t>Bitno</a:t>
+            </a:r>
+            <a:r>
+              <a:rPr lang="en-US" sz="1600" dirty="0">
+                <a:latin typeface="helvetica" panose="020B0604020202020204" pitchFamily="34" charset="0"/>
+                <a:cs typeface="helvetica" panose="020B0604020202020204" pitchFamily="34" charset="0"/>
+              </a:rPr>
+              <a:t> je da </a:t>
+            </a:r>
+            <a:r>
+              <a:rPr lang="en-US" sz="1600" dirty="0" err="1">
+                <a:latin typeface="helvetica" panose="020B0604020202020204" pitchFamily="34" charset="0"/>
+                <a:cs typeface="helvetica" panose="020B0604020202020204" pitchFamily="34" charset="0"/>
+              </a:rPr>
+              <a:t>članovi</a:t>
+            </a:r>
+            <a:r>
+              <a:rPr lang="en-US" sz="1600" dirty="0">
+                <a:latin typeface="helvetica" panose="020B0604020202020204" pitchFamily="34" charset="0"/>
+                <a:cs typeface="helvetica" panose="020B0604020202020204" pitchFamily="34" charset="0"/>
+              </a:rPr>
+              <a:t> </a:t>
+            </a:r>
+            <a:r>
+              <a:rPr lang="en-US" sz="1600" dirty="0" err="1">
+                <a:latin typeface="helvetica" panose="020B0604020202020204" pitchFamily="34" charset="0"/>
+                <a:cs typeface="helvetica" panose="020B0604020202020204" pitchFamily="34" charset="0"/>
+              </a:rPr>
+              <a:t>tima</a:t>
+            </a:r>
+            <a:r>
+              <a:rPr lang="en-US" sz="1600" dirty="0">
+                <a:latin typeface="helvetica" panose="020B0604020202020204" pitchFamily="34" charset="0"/>
+                <a:cs typeface="helvetica" panose="020B0604020202020204" pitchFamily="34" charset="0"/>
+              </a:rPr>
+              <a:t> </a:t>
+            </a:r>
+            <a:r>
+              <a:rPr lang="en-US" sz="1600" dirty="0" err="1">
+                <a:latin typeface="helvetica" panose="020B0604020202020204" pitchFamily="34" charset="0"/>
+                <a:cs typeface="helvetica" panose="020B0604020202020204" pitchFamily="34" charset="0"/>
+              </a:rPr>
+              <a:t>mogu</a:t>
+            </a:r>
+            <a:r>
+              <a:rPr lang="en-US" sz="1600" dirty="0">
+                <a:latin typeface="helvetica" panose="020B0604020202020204" pitchFamily="34" charset="0"/>
+                <a:cs typeface="helvetica" panose="020B0604020202020204" pitchFamily="34" charset="0"/>
+              </a:rPr>
+              <a:t> </a:t>
+            </a:r>
+            <a:r>
+              <a:rPr lang="en-US" sz="1600" dirty="0" err="1">
+                <a:latin typeface="helvetica" panose="020B0604020202020204" pitchFamily="34" charset="0"/>
+                <a:cs typeface="helvetica" panose="020B0604020202020204" pitchFamily="34" charset="0"/>
+              </a:rPr>
+              <a:t>brzo</a:t>
+            </a:r>
+            <a:r>
+              <a:rPr lang="en-US" sz="1600" dirty="0">
+                <a:latin typeface="helvetica" panose="020B0604020202020204" pitchFamily="34" charset="0"/>
+                <a:cs typeface="helvetica" panose="020B0604020202020204" pitchFamily="34" charset="0"/>
+              </a:rPr>
+              <a:t> </a:t>
+            </a:r>
+            <a:r>
+              <a:rPr lang="en-US" sz="1600" dirty="0" err="1">
+                <a:latin typeface="helvetica" panose="020B0604020202020204" pitchFamily="34" charset="0"/>
+                <a:cs typeface="helvetica" panose="020B0604020202020204" pitchFamily="34" charset="0"/>
+              </a:rPr>
+              <a:t>savladati</a:t>
+            </a:r>
+            <a:r>
+              <a:rPr lang="en-US" sz="1600" dirty="0">
+                <a:latin typeface="helvetica" panose="020B0604020202020204" pitchFamily="34" charset="0"/>
+                <a:cs typeface="helvetica" panose="020B0604020202020204" pitchFamily="34" charset="0"/>
+              </a:rPr>
+              <a:t> </a:t>
+            </a:r>
+            <a:r>
+              <a:rPr lang="en-US" sz="1600" dirty="0" err="1">
+                <a:latin typeface="helvetica" panose="020B0604020202020204" pitchFamily="34" charset="0"/>
+                <a:cs typeface="helvetica" panose="020B0604020202020204" pitchFamily="34" charset="0"/>
+              </a:rPr>
+              <a:t>osnove</a:t>
+            </a:r>
+            <a:r>
+              <a:rPr lang="en-US" sz="1600" dirty="0">
+                <a:latin typeface="helvetica" panose="020B0604020202020204" pitchFamily="34" charset="0"/>
+                <a:cs typeface="helvetica" panose="020B0604020202020204" pitchFamily="34" charset="0"/>
+              </a:rPr>
+              <a:t> </a:t>
+            </a:r>
+            <a:r>
+              <a:rPr lang="en-US" sz="1600" dirty="0" err="1">
+                <a:latin typeface="helvetica" panose="020B0604020202020204" pitchFamily="34" charset="0"/>
+                <a:cs typeface="helvetica" panose="020B0604020202020204" pitchFamily="34" charset="0"/>
+              </a:rPr>
+              <a:t>neke</a:t>
+            </a:r>
+            <a:r>
+              <a:rPr lang="en-US" sz="1600" dirty="0">
+                <a:latin typeface="helvetica" panose="020B0604020202020204" pitchFamily="34" charset="0"/>
+                <a:cs typeface="helvetica" panose="020B0604020202020204" pitchFamily="34" charset="0"/>
+              </a:rPr>
+              <a:t> </a:t>
+            </a:r>
+            <a:r>
+              <a:rPr lang="en-US" sz="1600" dirty="0" err="1">
+                <a:latin typeface="helvetica" panose="020B0604020202020204" pitchFamily="34" charset="0"/>
+                <a:cs typeface="helvetica" panose="020B0604020202020204" pitchFamily="34" charset="0"/>
+              </a:rPr>
+              <a:t>tehnologije</a:t>
+            </a:r>
+            <a:r>
+              <a:rPr lang="en-US" sz="1600" dirty="0">
+                <a:latin typeface="helvetica" panose="020B0604020202020204" pitchFamily="34" charset="0"/>
+                <a:cs typeface="helvetica" panose="020B0604020202020204" pitchFamily="34" charset="0"/>
+              </a:rPr>
+              <a:t> </a:t>
+            </a:r>
+            <a:r>
+              <a:rPr lang="en-US" sz="1600" dirty="0" err="1">
+                <a:latin typeface="helvetica" panose="020B0604020202020204" pitchFamily="34" charset="0"/>
+                <a:cs typeface="helvetica" panose="020B0604020202020204" pitchFamily="34" charset="0"/>
+              </a:rPr>
+              <a:t>korištene</a:t>
+            </a:r>
+            <a:r>
+              <a:rPr lang="en-US" sz="1600" dirty="0">
+                <a:latin typeface="helvetica" panose="020B0604020202020204" pitchFamily="34" charset="0"/>
+                <a:cs typeface="helvetica" panose="020B0604020202020204" pitchFamily="34" charset="0"/>
+              </a:rPr>
+              <a:t> u </a:t>
+            </a:r>
+            <a:r>
+              <a:rPr lang="en-US" sz="1600" dirty="0" err="1">
+                <a:latin typeface="helvetica" panose="020B0604020202020204" pitchFamily="34" charset="0"/>
+                <a:cs typeface="helvetica" panose="020B0604020202020204" pitchFamily="34" charset="0"/>
+              </a:rPr>
+              <a:t>razvoju</a:t>
+            </a:r>
+            <a:endParaRPr lang="en-US" sz="1600" dirty="0">
+              <a:latin typeface="helvetica" panose="020B0604020202020204" pitchFamily="34" charset="0"/>
+              <a:cs typeface="helvetica" panose="020B0604020202020204" pitchFamily="34" charset="0"/>
+            </a:endParaRPr>
+          </a:p>
+          <a:p>
+            <a:pPr lvl="2">
+              <a:buFont typeface="Wingdings" panose="05000000000000000000" pitchFamily="2" charset="2"/>
+              <a:buChar char="§"/>
+            </a:pPr>
+            <a:r>
+              <a:rPr lang="en-US" sz="1600" dirty="0" err="1">
+                <a:latin typeface="helvetica" panose="020B0604020202020204" pitchFamily="34" charset="0"/>
+                <a:cs typeface="helvetica" panose="020B0604020202020204" pitchFamily="34" charset="0"/>
+              </a:rPr>
+              <a:t>Poželjno</a:t>
+            </a:r>
+            <a:r>
+              <a:rPr lang="en-US" sz="1600" dirty="0">
+                <a:latin typeface="helvetica" panose="020B0604020202020204" pitchFamily="34" charset="0"/>
+                <a:cs typeface="helvetica" panose="020B0604020202020204" pitchFamily="34" charset="0"/>
+              </a:rPr>
+              <a:t> je da </a:t>
+            </a:r>
+            <a:r>
+              <a:rPr lang="en-US" sz="1600" dirty="0" err="1">
+                <a:latin typeface="helvetica" panose="020B0604020202020204" pitchFamily="34" charset="0"/>
+                <a:cs typeface="helvetica" panose="020B0604020202020204" pitchFamily="34" charset="0"/>
+              </a:rPr>
+              <a:t>neki</a:t>
+            </a:r>
+            <a:r>
+              <a:rPr lang="en-US" sz="1600" dirty="0">
+                <a:latin typeface="helvetica" panose="020B0604020202020204" pitchFamily="34" charset="0"/>
+                <a:cs typeface="helvetica" panose="020B0604020202020204" pitchFamily="34" charset="0"/>
+              </a:rPr>
+              <a:t> </a:t>
+            </a:r>
+            <a:r>
+              <a:rPr lang="en-US" sz="1600" dirty="0" err="1">
+                <a:latin typeface="helvetica" panose="020B0604020202020204" pitchFamily="34" charset="0"/>
+                <a:cs typeface="helvetica" panose="020B0604020202020204" pitchFamily="34" charset="0"/>
+              </a:rPr>
+              <a:t>članovi</a:t>
+            </a:r>
+            <a:r>
+              <a:rPr lang="en-US" sz="1600" dirty="0">
+                <a:latin typeface="helvetica" panose="020B0604020202020204" pitchFamily="34" charset="0"/>
+                <a:cs typeface="helvetica" panose="020B0604020202020204" pitchFamily="34" charset="0"/>
+              </a:rPr>
+              <a:t> </a:t>
+            </a:r>
+            <a:r>
+              <a:rPr lang="en-US" sz="1600" dirty="0" err="1">
+                <a:latin typeface="helvetica" panose="020B0604020202020204" pitchFamily="34" charset="0"/>
+                <a:cs typeface="helvetica" panose="020B0604020202020204" pitchFamily="34" charset="0"/>
+              </a:rPr>
+              <a:t>već</a:t>
+            </a:r>
+            <a:r>
+              <a:rPr lang="en-US" sz="1600" dirty="0">
+                <a:latin typeface="helvetica" panose="020B0604020202020204" pitchFamily="34" charset="0"/>
+                <a:cs typeface="helvetica" panose="020B0604020202020204" pitchFamily="34" charset="0"/>
+              </a:rPr>
+              <a:t> </a:t>
+            </a:r>
+            <a:r>
+              <a:rPr lang="en-US" sz="1600" dirty="0" err="1">
+                <a:latin typeface="helvetica" panose="020B0604020202020204" pitchFamily="34" charset="0"/>
+                <a:cs typeface="helvetica" panose="020B0604020202020204" pitchFamily="34" charset="0"/>
+              </a:rPr>
+              <a:t>imaju</a:t>
+            </a:r>
+            <a:r>
+              <a:rPr lang="en-US" sz="1600" dirty="0">
+                <a:latin typeface="helvetica" panose="020B0604020202020204" pitchFamily="34" charset="0"/>
+                <a:cs typeface="helvetica" panose="020B0604020202020204" pitchFamily="34" charset="0"/>
+              </a:rPr>
+              <a:t> </a:t>
+            </a:r>
+            <a:r>
+              <a:rPr lang="en-US" sz="1600" dirty="0" err="1">
+                <a:latin typeface="helvetica" panose="020B0604020202020204" pitchFamily="34" charset="0"/>
+                <a:cs typeface="helvetica" panose="020B0604020202020204" pitchFamily="34" charset="0"/>
+              </a:rPr>
+              <a:t>iskustva</a:t>
+            </a:r>
+            <a:r>
+              <a:rPr lang="en-US" sz="1600" dirty="0">
+                <a:latin typeface="helvetica" panose="020B0604020202020204" pitchFamily="34" charset="0"/>
+                <a:cs typeface="helvetica" panose="020B0604020202020204" pitchFamily="34" charset="0"/>
+              </a:rPr>
+              <a:t> s </a:t>
+            </a:r>
+            <a:r>
+              <a:rPr lang="en-US" sz="1600" dirty="0" err="1">
+                <a:latin typeface="helvetica" panose="020B0604020202020204" pitchFamily="34" charset="0"/>
+                <a:cs typeface="helvetica" panose="020B0604020202020204" pitchFamily="34" charset="0"/>
+              </a:rPr>
+              <a:t>njom</a:t>
+            </a:r>
+            <a:endParaRPr lang="en-US" sz="1600" dirty="0">
+              <a:latin typeface="helvetica" panose="020B0604020202020204" pitchFamily="34" charset="0"/>
+              <a:cs typeface="helvetica" panose="020B0604020202020204" pitchFamily="34" charset="0"/>
+            </a:endParaRPr>
           </a:p>
           <a:p>
             <a:pPr lvl="1">
@@ -4429,32 +5613,195 @@
               <a:buChar char="§"/>
             </a:pPr>
             <a:r>
-              <a:rPr lang="hr-HR" sz="2400" dirty="0">
-                <a:latin typeface="helvetica" panose="020B0604020202020204" pitchFamily="34" charset="0"/>
-                <a:cs typeface="helvetica" panose="020B0604020202020204" pitchFamily="34" charset="0"/>
-              </a:rPr>
-              <a:t>Iskustvo za daljnji razvoj znanja u području razvoja programske potpore i priprema za praktičan rad u industriji</a:t>
-            </a:r>
-          </a:p>
-          <a:p>
-            <a:pPr lvl="1">
-              <a:buFont typeface="Wingdings" panose="05000000000000000000" pitchFamily="2" charset="2"/>
-              <a:buChar char="§"/>
-            </a:pPr>
-            <a:r>
-              <a:rPr lang="hr-HR" sz="2400" dirty="0">
-                <a:latin typeface="helvetica" panose="020B0604020202020204" pitchFamily="34" charset="0"/>
-                <a:cs typeface="helvetica" panose="020B0604020202020204" pitchFamily="34" charset="0"/>
-              </a:rPr>
-              <a:t>Budući da je projekt uspješno završen, sve je dobro naučeno</a:t>
-            </a:r>
-          </a:p>
-          <a:p>
-            <a:pPr lvl="1">
-              <a:buFont typeface="Wingdings" panose="05000000000000000000" pitchFamily="2" charset="2"/>
-              <a:buChar char="§"/>
-            </a:pPr>
-            <a:endParaRPr lang="hr-HR" sz="2400" dirty="0">
+              <a:rPr lang="en-US" sz="2000" dirty="0" err="1">
+                <a:latin typeface="helvetica" panose="020B0604020202020204" pitchFamily="34" charset="0"/>
+                <a:cs typeface="helvetica" panose="020B0604020202020204" pitchFamily="34" charset="0"/>
+              </a:rPr>
+              <a:t>Korisno</a:t>
+            </a:r>
+            <a:r>
+              <a:rPr lang="en-US" sz="2000" dirty="0">
+                <a:latin typeface="helvetica" panose="020B0604020202020204" pitchFamily="34" charset="0"/>
+                <a:cs typeface="helvetica" panose="020B0604020202020204" pitchFamily="34" charset="0"/>
+              </a:rPr>
+              <a:t> je </a:t>
+            </a:r>
+            <a:r>
+              <a:rPr lang="en-US" sz="2000" dirty="0" err="1">
+                <a:latin typeface="helvetica" panose="020B0604020202020204" pitchFamily="34" charset="0"/>
+                <a:cs typeface="helvetica" panose="020B0604020202020204" pitchFamily="34" charset="0"/>
+              </a:rPr>
+              <a:t>prilikom</a:t>
+            </a:r>
+            <a:r>
+              <a:rPr lang="en-US" sz="2000" dirty="0">
+                <a:latin typeface="helvetica" panose="020B0604020202020204" pitchFamily="34" charset="0"/>
+                <a:cs typeface="helvetica" panose="020B0604020202020204" pitchFamily="34" charset="0"/>
+              </a:rPr>
+              <a:t> </a:t>
+            </a:r>
+            <a:r>
+              <a:rPr lang="en-US" sz="2000" dirty="0" err="1">
+                <a:latin typeface="helvetica" panose="020B0604020202020204" pitchFamily="34" charset="0"/>
+                <a:cs typeface="helvetica" panose="020B0604020202020204" pitchFamily="34" charset="0"/>
+              </a:rPr>
+              <a:t>implementacije</a:t>
+            </a:r>
+            <a:r>
+              <a:rPr lang="en-US" sz="2000" dirty="0">
+                <a:latin typeface="helvetica" panose="020B0604020202020204" pitchFamily="34" charset="0"/>
+                <a:cs typeface="helvetica" panose="020B0604020202020204" pitchFamily="34" charset="0"/>
+              </a:rPr>
+              <a:t> </a:t>
+            </a:r>
+            <a:r>
+              <a:rPr lang="en-US" sz="2000" dirty="0" err="1">
+                <a:latin typeface="helvetica" panose="020B0604020202020204" pitchFamily="34" charset="0"/>
+                <a:cs typeface="helvetica" panose="020B0604020202020204" pitchFamily="34" charset="0"/>
+              </a:rPr>
+              <a:t>razviti</a:t>
+            </a:r>
+            <a:r>
+              <a:rPr lang="en-US" sz="2000" dirty="0">
+                <a:latin typeface="helvetica" panose="020B0604020202020204" pitchFamily="34" charset="0"/>
+                <a:cs typeface="helvetica" panose="020B0604020202020204" pitchFamily="34" charset="0"/>
+              </a:rPr>
+              <a:t> </a:t>
+            </a:r>
+            <a:r>
+              <a:rPr lang="en-US" sz="2000" dirty="0" err="1">
+                <a:latin typeface="helvetica" panose="020B0604020202020204" pitchFamily="34" charset="0"/>
+                <a:cs typeface="helvetica" panose="020B0604020202020204" pitchFamily="34" charset="0"/>
+              </a:rPr>
+              <a:t>najprije</a:t>
+            </a:r>
+            <a:r>
+              <a:rPr lang="en-US" sz="2000" dirty="0">
+                <a:latin typeface="helvetica" panose="020B0604020202020204" pitchFamily="34" charset="0"/>
+                <a:cs typeface="helvetica" panose="020B0604020202020204" pitchFamily="34" charset="0"/>
+              </a:rPr>
+              <a:t> </a:t>
+            </a:r>
+            <a:r>
+              <a:rPr lang="en-US" sz="2000" dirty="0" err="1">
+                <a:latin typeface="helvetica" panose="020B0604020202020204" pitchFamily="34" charset="0"/>
+                <a:cs typeface="helvetica" panose="020B0604020202020204" pitchFamily="34" charset="0"/>
+              </a:rPr>
+              <a:t>temeljni</a:t>
+            </a:r>
+            <a:r>
+              <a:rPr lang="en-US" sz="2000" dirty="0">
+                <a:latin typeface="helvetica" panose="020B0604020202020204" pitchFamily="34" charset="0"/>
+                <a:cs typeface="helvetica" panose="020B0604020202020204" pitchFamily="34" charset="0"/>
+              </a:rPr>
+              <a:t> </a:t>
+            </a:r>
+            <a:r>
+              <a:rPr lang="en-US" sz="2000" dirty="0" err="1">
+                <a:latin typeface="helvetica" panose="020B0604020202020204" pitchFamily="34" charset="0"/>
+                <a:cs typeface="helvetica" panose="020B0604020202020204" pitchFamily="34" charset="0"/>
+              </a:rPr>
+              <a:t>dio</a:t>
+            </a:r>
+            <a:r>
+              <a:rPr lang="en-US" sz="2000" dirty="0">
+                <a:latin typeface="helvetica" panose="020B0604020202020204" pitchFamily="34" charset="0"/>
+                <a:cs typeface="helvetica" panose="020B0604020202020204" pitchFamily="34" charset="0"/>
+              </a:rPr>
+              <a:t>, a </a:t>
+            </a:r>
+            <a:r>
+              <a:rPr lang="en-US" sz="2000" dirty="0" err="1">
+                <a:latin typeface="helvetica" panose="020B0604020202020204" pitchFamily="34" charset="0"/>
+                <a:cs typeface="helvetica" panose="020B0604020202020204" pitchFamily="34" charset="0"/>
+              </a:rPr>
+              <a:t>tek</a:t>
+            </a:r>
+            <a:r>
+              <a:rPr lang="en-US" sz="2000" dirty="0">
+                <a:latin typeface="helvetica" panose="020B0604020202020204" pitchFamily="34" charset="0"/>
+                <a:cs typeface="helvetica" panose="020B0604020202020204" pitchFamily="34" charset="0"/>
+              </a:rPr>
+              <a:t> </a:t>
+            </a:r>
+            <a:r>
+              <a:rPr lang="en-US" sz="2000" dirty="0" err="1">
+                <a:latin typeface="helvetica" panose="020B0604020202020204" pitchFamily="34" charset="0"/>
+                <a:cs typeface="helvetica" panose="020B0604020202020204" pitchFamily="34" charset="0"/>
+              </a:rPr>
+              <a:t>nakon</a:t>
+            </a:r>
+            <a:r>
+              <a:rPr lang="en-US" sz="2000" dirty="0">
+                <a:latin typeface="helvetica" panose="020B0604020202020204" pitchFamily="34" charset="0"/>
+                <a:cs typeface="helvetica" panose="020B0604020202020204" pitchFamily="34" charset="0"/>
+              </a:rPr>
+              <a:t> toga </a:t>
+            </a:r>
+            <a:r>
+              <a:rPr lang="en-US" sz="2000" dirty="0" err="1">
+                <a:latin typeface="helvetica" panose="020B0604020202020204" pitchFamily="34" charset="0"/>
+                <a:cs typeface="helvetica" panose="020B0604020202020204" pitchFamily="34" charset="0"/>
+              </a:rPr>
+              <a:t>ga</a:t>
+            </a:r>
+            <a:r>
+              <a:rPr lang="en-US" sz="2000" dirty="0">
+                <a:latin typeface="helvetica" panose="020B0604020202020204" pitchFamily="34" charset="0"/>
+                <a:cs typeface="helvetica" panose="020B0604020202020204" pitchFamily="34" charset="0"/>
+              </a:rPr>
+              <a:t> </a:t>
+            </a:r>
+            <a:r>
+              <a:rPr lang="en-US" sz="2000" dirty="0" err="1">
+                <a:latin typeface="helvetica" panose="020B0604020202020204" pitchFamily="34" charset="0"/>
+                <a:cs typeface="helvetica" panose="020B0604020202020204" pitchFamily="34" charset="0"/>
+              </a:rPr>
+              <a:t>unaprjeđivati</a:t>
+            </a:r>
+            <a:r>
+              <a:rPr lang="en-US" sz="2000" dirty="0">
+                <a:latin typeface="helvetica" panose="020B0604020202020204" pitchFamily="34" charset="0"/>
+                <a:cs typeface="helvetica" panose="020B0604020202020204" pitchFamily="34" charset="0"/>
+              </a:rPr>
+              <a:t> </a:t>
+            </a:r>
+            <a:r>
+              <a:rPr lang="en-US" sz="2000" dirty="0" err="1">
+                <a:latin typeface="helvetica" panose="020B0604020202020204" pitchFamily="34" charset="0"/>
+                <a:cs typeface="helvetica" panose="020B0604020202020204" pitchFamily="34" charset="0"/>
+              </a:rPr>
+              <a:t>uz</a:t>
+            </a:r>
+            <a:r>
+              <a:rPr lang="en-US" sz="2000" dirty="0">
+                <a:latin typeface="helvetica" panose="020B0604020202020204" pitchFamily="34" charset="0"/>
+                <a:cs typeface="helvetica" panose="020B0604020202020204" pitchFamily="34" charset="0"/>
+              </a:rPr>
+              <a:t> </a:t>
+            </a:r>
+            <a:r>
+              <a:rPr lang="en-US" sz="2000" dirty="0" err="1">
+                <a:latin typeface="helvetica" panose="020B0604020202020204" pitchFamily="34" charset="0"/>
+                <a:cs typeface="helvetica" panose="020B0604020202020204" pitchFamily="34" charset="0"/>
+              </a:rPr>
+              <a:t>kontinuirano</a:t>
+            </a:r>
+            <a:r>
+              <a:rPr lang="en-US" sz="2000" dirty="0">
+                <a:latin typeface="helvetica" panose="020B0604020202020204" pitchFamily="34" charset="0"/>
+                <a:cs typeface="helvetica" panose="020B0604020202020204" pitchFamily="34" charset="0"/>
+              </a:rPr>
+              <a:t> </a:t>
+            </a:r>
+            <a:r>
+              <a:rPr lang="en-US" sz="2000" dirty="0" err="1">
+                <a:latin typeface="helvetica" panose="020B0604020202020204" pitchFamily="34" charset="0"/>
+                <a:cs typeface="helvetica" panose="020B0604020202020204" pitchFamily="34" charset="0"/>
+              </a:rPr>
+              <a:t>testiranje</a:t>
+            </a:r>
+            <a:endParaRPr lang="en-US" sz="2000" dirty="0">
               <a:latin typeface="helvetica" panose="020B0604020202020204" pitchFamily="34" charset="0"/>
               <a:cs typeface="helvetica" panose="020B0604020202020204" pitchFamily="34" charset="0"/>
             </a:endParaRPr>
@@ -4474,7 +5821,7 @@
 </p:sld>
 </file>
 
-<file path=ppt/slides/slide11.xml><?xml version="1.0" encoding="utf-8"?>
+<file path=ppt/slides/slide12.xml><?xml version="1.0" encoding="utf-8"?>
 <p:sld xmlns:a="http://schemas.openxmlformats.org/drawingml/2006/main" xmlns:r="http://schemas.openxmlformats.org/officeDocument/2006/relationships" xmlns:p="http://schemas.openxmlformats.org/presentationml/2006/main">
   <p:cSld>
     <p:bg>
@@ -5771,7 +7118,7 @@
         </p:spPr>
         <p:txBody>
           <a:bodyPr>
-            <a:normAutofit fontScale="92500" lnSpcReduction="10000"/>
+            <a:normAutofit fontScale="92500" lnSpcReduction="20000"/>
           </a:bodyPr>
           <a:lstStyle/>
           <a:p>
@@ -5860,6 +7207,97 @@
               </a:rPr>
               <a:t>Prilagođenost sučelja za servisere za uporabu u okruženju servisa</a:t>
             </a:r>
+            <a:endParaRPr lang="en-US" sz="2400" dirty="0">
+              <a:latin typeface="helvetica" panose="020B0604020202020204" pitchFamily="34" charset="0"/>
+              <a:cs typeface="helvetica" panose="020B0604020202020204" pitchFamily="34" charset="0"/>
+            </a:endParaRPr>
+          </a:p>
+          <a:p>
+            <a:pPr>
+              <a:buFont typeface="Wingdings" panose="05000000000000000000" pitchFamily="2" charset="2"/>
+              <a:buChar char="§"/>
+            </a:pPr>
+            <a:r>
+              <a:rPr lang="en-US" sz="2400" dirty="0" err="1">
+                <a:latin typeface="helvetica" panose="020B0604020202020204" pitchFamily="34" charset="0"/>
+                <a:cs typeface="helvetica" panose="020B0604020202020204" pitchFamily="34" charset="0"/>
+              </a:rPr>
+              <a:t>Responzivno</a:t>
+            </a:r>
+            <a:r>
+              <a:rPr lang="en-US" sz="2400" dirty="0">
+                <a:latin typeface="helvetica" panose="020B0604020202020204" pitchFamily="34" charset="0"/>
+                <a:cs typeface="helvetica" panose="020B0604020202020204" pitchFamily="34" charset="0"/>
+              </a:rPr>
+              <a:t> </a:t>
+            </a:r>
+            <a:r>
+              <a:rPr lang="en-US" sz="2400" dirty="0" err="1">
+                <a:latin typeface="helvetica" panose="020B0604020202020204" pitchFamily="34" charset="0"/>
+                <a:cs typeface="helvetica" panose="020B0604020202020204" pitchFamily="34" charset="0"/>
+              </a:rPr>
+              <a:t>korisničko</a:t>
+            </a:r>
+            <a:r>
+              <a:rPr lang="en-US" sz="2400" dirty="0">
+                <a:latin typeface="helvetica" panose="020B0604020202020204" pitchFamily="34" charset="0"/>
+                <a:cs typeface="helvetica" panose="020B0604020202020204" pitchFamily="34" charset="0"/>
+              </a:rPr>
+              <a:t> </a:t>
+            </a:r>
+            <a:r>
+              <a:rPr lang="en-US" sz="2400" dirty="0" err="1">
+                <a:latin typeface="helvetica" panose="020B0604020202020204" pitchFamily="34" charset="0"/>
+                <a:cs typeface="helvetica" panose="020B0604020202020204" pitchFamily="34" charset="0"/>
+              </a:rPr>
+              <a:t>sučelje</a:t>
+            </a:r>
+            <a:r>
+              <a:rPr lang="en-US" sz="2400" dirty="0">
+                <a:latin typeface="helvetica" panose="020B0604020202020204" pitchFamily="34" charset="0"/>
+                <a:cs typeface="helvetica" panose="020B0604020202020204" pitchFamily="34" charset="0"/>
+              </a:rPr>
+              <a:t> </a:t>
+            </a:r>
+            <a:r>
+              <a:rPr lang="en-US" sz="2400" dirty="0" err="1">
+                <a:latin typeface="helvetica" panose="020B0604020202020204" pitchFamily="34" charset="0"/>
+                <a:cs typeface="helvetica" panose="020B0604020202020204" pitchFamily="34" charset="0"/>
+              </a:rPr>
+              <a:t>prilagođeno</a:t>
+            </a:r>
+            <a:r>
+              <a:rPr lang="en-US" sz="2400" dirty="0">
+                <a:latin typeface="helvetica" panose="020B0604020202020204" pitchFamily="34" charset="0"/>
+                <a:cs typeface="helvetica" panose="020B0604020202020204" pitchFamily="34" charset="0"/>
+              </a:rPr>
+              <a:t> </a:t>
+            </a:r>
+            <a:r>
+              <a:rPr lang="en-US" sz="2400" dirty="0" err="1">
+                <a:latin typeface="helvetica" panose="020B0604020202020204" pitchFamily="34" charset="0"/>
+                <a:cs typeface="helvetica" panose="020B0604020202020204" pitchFamily="34" charset="0"/>
+              </a:rPr>
+              <a:t>različitim</a:t>
+            </a:r>
+            <a:r>
+              <a:rPr lang="en-US" sz="2400" dirty="0">
+                <a:latin typeface="helvetica" panose="020B0604020202020204" pitchFamily="34" charset="0"/>
+                <a:cs typeface="helvetica" panose="020B0604020202020204" pitchFamily="34" charset="0"/>
+              </a:rPr>
+              <a:t> </a:t>
+            </a:r>
+            <a:r>
+              <a:rPr lang="en-US" sz="2400" dirty="0" err="1">
+                <a:latin typeface="helvetica" panose="020B0604020202020204" pitchFamily="34" charset="0"/>
+                <a:cs typeface="helvetica" panose="020B0604020202020204" pitchFamily="34" charset="0"/>
+              </a:rPr>
+              <a:t>uređajima</a:t>
+            </a:r>
+            <a:endParaRPr lang="hr-HR" sz="2400" dirty="0">
+              <a:latin typeface="helvetica" panose="020B0604020202020204" pitchFamily="34" charset="0"/>
+              <a:cs typeface="helvetica" panose="020B0604020202020204" pitchFamily="34" charset="0"/>
+            </a:endParaRPr>
           </a:p>
           <a:p>
             <a:pPr>
@@ -7008,7 +8446,7 @@
         </p:spPr>
         <p:txBody>
           <a:bodyPr>
-            <a:normAutofit fontScale="92500" lnSpcReduction="10000"/>
+            <a:normAutofit/>
           </a:bodyPr>
           <a:lstStyle/>
           <a:p>
@@ -7071,19 +8509,6 @@
               <a:latin typeface="helvetica" panose="020B0604020202020204" pitchFamily="34" charset="0"/>
               <a:cs typeface="helvetica" panose="020B0604020202020204" pitchFamily="34" charset="0"/>
             </a:endParaRPr>
-          </a:p>
-          <a:p>
-            <a:pPr>
-              <a:buFont typeface="Wingdings" panose="05000000000000000000" pitchFamily="2" charset="2"/>
-              <a:buChar char="§"/>
-            </a:pPr>
-            <a:r>
-              <a:rPr lang="hr-HR" sz="2600" dirty="0">
-                <a:latin typeface="helvetica" panose="020B0604020202020204" pitchFamily="34" charset="0"/>
-                <a:cs typeface="helvetica" panose="020B0604020202020204" pitchFamily="34" charset="0"/>
-              </a:rPr>
-              <a:t>Raspodjela posla: developeri(5), testeri(7), izrada dokumentacije(7)     </a:t>
-            </a:r>
           </a:p>
           <a:p>
             <a:endParaRPr lang="hr-HR" u="sng" dirty="0">
@@ -7114,7 +8539,7 @@
         </p:blipFill>
         <p:spPr>
           <a:xfrm>
-            <a:off x="193731" y="2196408"/>
+            <a:off x="193732" y="2320175"/>
             <a:ext cx="8802255" cy="2800465"/>
           </a:xfrm>
           <a:prstGeom prst="rect">

</xml_diff>